<commit_message>
Added text to documentation
</commit_message>
<xml_diff>
--- a/structure/Basic model infrastructure.pptx
+++ b/structure/Basic model infrastructure.pptx
@@ -243,7 +243,7 @@
           <a:p>
             <a:fld id="{3B2D1E4C-4D5B-4EF9-8552-C8E183A4FDD7}" type="datetimeFigureOut">
               <a:rPr lang="en-GB" smtClean="0"/>
-              <a:t>26/03/2018</a:t>
+              <a:t>27/03/2018</a:t>
             </a:fld>
             <a:endParaRPr lang="en-GB"/>
           </a:p>
@@ -413,7 +413,7 @@
           <a:p>
             <a:fld id="{3B2D1E4C-4D5B-4EF9-8552-C8E183A4FDD7}" type="datetimeFigureOut">
               <a:rPr lang="en-GB" smtClean="0"/>
-              <a:t>26/03/2018</a:t>
+              <a:t>27/03/2018</a:t>
             </a:fld>
             <a:endParaRPr lang="en-GB"/>
           </a:p>
@@ -593,7 +593,7 @@
           <a:p>
             <a:fld id="{3B2D1E4C-4D5B-4EF9-8552-C8E183A4FDD7}" type="datetimeFigureOut">
               <a:rPr lang="en-GB" smtClean="0"/>
-              <a:t>26/03/2018</a:t>
+              <a:t>27/03/2018</a:t>
             </a:fld>
             <a:endParaRPr lang="en-GB"/>
           </a:p>
@@ -763,7 +763,7 @@
           <a:p>
             <a:fld id="{3B2D1E4C-4D5B-4EF9-8552-C8E183A4FDD7}" type="datetimeFigureOut">
               <a:rPr lang="en-GB" smtClean="0"/>
-              <a:t>26/03/2018</a:t>
+              <a:t>27/03/2018</a:t>
             </a:fld>
             <a:endParaRPr lang="en-GB"/>
           </a:p>
@@ -1009,7 +1009,7 @@
           <a:p>
             <a:fld id="{3B2D1E4C-4D5B-4EF9-8552-C8E183A4FDD7}" type="datetimeFigureOut">
               <a:rPr lang="en-GB" smtClean="0"/>
-              <a:t>26/03/2018</a:t>
+              <a:t>27/03/2018</a:t>
             </a:fld>
             <a:endParaRPr lang="en-GB"/>
           </a:p>
@@ -1241,7 +1241,7 @@
           <a:p>
             <a:fld id="{3B2D1E4C-4D5B-4EF9-8552-C8E183A4FDD7}" type="datetimeFigureOut">
               <a:rPr lang="en-GB" smtClean="0"/>
-              <a:t>26/03/2018</a:t>
+              <a:t>27/03/2018</a:t>
             </a:fld>
             <a:endParaRPr lang="en-GB"/>
           </a:p>
@@ -1608,7 +1608,7 @@
           <a:p>
             <a:fld id="{3B2D1E4C-4D5B-4EF9-8552-C8E183A4FDD7}" type="datetimeFigureOut">
               <a:rPr lang="en-GB" smtClean="0"/>
-              <a:t>26/03/2018</a:t>
+              <a:t>27/03/2018</a:t>
             </a:fld>
             <a:endParaRPr lang="en-GB"/>
           </a:p>
@@ -1726,7 +1726,7 @@
           <a:p>
             <a:fld id="{3B2D1E4C-4D5B-4EF9-8552-C8E183A4FDD7}" type="datetimeFigureOut">
               <a:rPr lang="en-GB" smtClean="0"/>
-              <a:t>26/03/2018</a:t>
+              <a:t>27/03/2018</a:t>
             </a:fld>
             <a:endParaRPr lang="en-GB"/>
           </a:p>
@@ -1821,7 +1821,7 @@
           <a:p>
             <a:fld id="{3B2D1E4C-4D5B-4EF9-8552-C8E183A4FDD7}" type="datetimeFigureOut">
               <a:rPr lang="en-GB" smtClean="0"/>
-              <a:t>26/03/2018</a:t>
+              <a:t>27/03/2018</a:t>
             </a:fld>
             <a:endParaRPr lang="en-GB"/>
           </a:p>
@@ -2098,7 +2098,7 @@
           <a:p>
             <a:fld id="{3B2D1E4C-4D5B-4EF9-8552-C8E183A4FDD7}" type="datetimeFigureOut">
               <a:rPr lang="en-GB" smtClean="0"/>
-              <a:t>26/03/2018</a:t>
+              <a:t>27/03/2018</a:t>
             </a:fld>
             <a:endParaRPr lang="en-GB"/>
           </a:p>
@@ -2351,7 +2351,7 @@
           <a:p>
             <a:fld id="{3B2D1E4C-4D5B-4EF9-8552-C8E183A4FDD7}" type="datetimeFigureOut">
               <a:rPr lang="en-GB" smtClean="0"/>
-              <a:t>26/03/2018</a:t>
+              <a:t>27/03/2018</a:t>
             </a:fld>
             <a:endParaRPr lang="en-GB"/>
           </a:p>
@@ -2564,7 +2564,7 @@
           <a:p>
             <a:fld id="{3B2D1E4C-4D5B-4EF9-8552-C8E183A4FDD7}" type="datetimeFigureOut">
               <a:rPr lang="en-GB" smtClean="0"/>
-              <a:t>26/03/2018</a:t>
+              <a:t>27/03/2018</a:t>
             </a:fld>
             <a:endParaRPr lang="en-GB"/>
           </a:p>
@@ -2969,64 +2969,466 @@
           <a:chExt cx="0" cy="0"/>
         </a:xfrm>
       </p:grpSpPr>
-      <p:sp>
-        <p:nvSpPr>
-          <p:cNvPr id="4" name="TextBox 3"/>
-          <p:cNvSpPr txBox="1"/>
+      <p:grpSp>
+        <p:nvGrpSpPr>
+          <p:cNvPr id="2" name="Group 1"/>
+          <p:cNvGrpSpPr/>
           <p:nvPr/>
-        </p:nvSpPr>
-        <p:spPr>
+        </p:nvGrpSpPr>
+        <p:grpSpPr>
           <a:xfrm>
-            <a:off x="404810" y="2667001"/>
-            <a:ext cx="1423988" cy="1200329"/>
+            <a:off x="404810" y="1066802"/>
+            <a:ext cx="9615490" cy="4694891"/>
+            <a:chOff x="404810" y="1066802"/>
+            <a:chExt cx="9615490" cy="4694891"/>
           </a:xfrm>
-          <a:prstGeom prst="rect">
-            <a:avLst/>
-          </a:prstGeom>
-          <a:ln>
-            <a:noFill/>
-          </a:ln>
-        </p:spPr>
-        <p:style>
-          <a:lnRef idx="1">
-            <a:schemeClr val="accent1"/>
-          </a:lnRef>
-          <a:fillRef idx="2">
-            <a:schemeClr val="accent1"/>
-          </a:fillRef>
-          <a:effectRef idx="1">
-            <a:schemeClr val="accent1"/>
-          </a:effectRef>
-          <a:fontRef idx="minor">
-            <a:schemeClr val="dk1"/>
-          </a:fontRef>
-        </p:style>
-        <p:txBody>
-          <a:bodyPr wrap="square" rtlCol="0">
-            <a:spAutoFit/>
-          </a:bodyPr>
-          <a:lstStyle/>
-          <a:p>
-            <a:r>
-              <a:rPr lang="en-GB" dirty="0" smtClean="0"/>
-              <a:t>Intervention effect on health risk factor</a:t>
-            </a:r>
-            <a:endParaRPr lang="en-GB" dirty="0"/>
-          </a:p>
-        </p:txBody>
-      </p:sp>
+        </p:grpSpPr>
+        <p:sp>
+          <p:nvSpPr>
+            <p:cNvPr id="4" name="TextBox 3"/>
+            <p:cNvSpPr txBox="1"/>
+            <p:nvPr/>
+          </p:nvSpPr>
+          <p:spPr>
+            <a:xfrm>
+              <a:off x="404810" y="2620525"/>
+              <a:ext cx="1423988" cy="1200329"/>
+            </a:xfrm>
+            <a:prstGeom prst="rect">
+              <a:avLst/>
+            </a:prstGeom>
+            <a:ln>
+              <a:noFill/>
+            </a:ln>
+          </p:spPr>
+          <p:style>
+            <a:lnRef idx="1">
+              <a:schemeClr val="accent1"/>
+            </a:lnRef>
+            <a:fillRef idx="2">
+              <a:schemeClr val="accent1"/>
+            </a:fillRef>
+            <a:effectRef idx="1">
+              <a:schemeClr val="accent1"/>
+            </a:effectRef>
+            <a:fontRef idx="minor">
+              <a:schemeClr val="dk1"/>
+            </a:fontRef>
+          </p:style>
+          <p:txBody>
+            <a:bodyPr wrap="square" rtlCol="0">
+              <a:spAutoFit/>
+            </a:bodyPr>
+            <a:lstStyle/>
+            <a:p>
+              <a:r>
+                <a:rPr lang="en-GB" dirty="0" smtClean="0"/>
+                <a:t>Intervention effect on health risk factor</a:t>
+              </a:r>
+              <a:endParaRPr lang="en-GB" dirty="0"/>
+            </a:p>
+          </p:txBody>
+        </p:sp>
+        <p:cxnSp>
+          <p:nvCxnSpPr>
+            <p:cNvPr id="6" name="Straight Arrow Connector 5"/>
+            <p:cNvCxnSpPr>
+              <a:stCxn id="4" idx="3"/>
+            </p:cNvCxnSpPr>
+            <p:nvPr/>
+          </p:nvCxnSpPr>
+          <p:spPr>
+            <a:xfrm flipV="1">
+              <a:off x="1828798" y="3198639"/>
+              <a:ext cx="290515" cy="0"/>
+            </a:xfrm>
+            <a:prstGeom prst="straightConnector1">
+              <a:avLst/>
+            </a:prstGeom>
+            <a:ln w="28575">
+              <a:solidFill>
+                <a:schemeClr val="tx1"/>
+              </a:solidFill>
+              <a:tailEnd type="triangle"/>
+            </a:ln>
+          </p:spPr>
+          <p:style>
+            <a:lnRef idx="1">
+              <a:schemeClr val="accent1"/>
+            </a:lnRef>
+            <a:fillRef idx="0">
+              <a:schemeClr val="accent1"/>
+            </a:fillRef>
+            <a:effectRef idx="0">
+              <a:schemeClr val="accent1"/>
+            </a:effectRef>
+            <a:fontRef idx="minor">
+              <a:schemeClr val="tx1"/>
+            </a:fontRef>
+          </p:style>
+        </p:cxnSp>
+        <p:sp>
+          <p:nvSpPr>
+            <p:cNvPr id="9" name="TextBox 8"/>
+            <p:cNvSpPr txBox="1"/>
+            <p:nvPr/>
+          </p:nvSpPr>
+          <p:spPr>
+            <a:xfrm>
+              <a:off x="2119313" y="2897524"/>
+              <a:ext cx="2054223" cy="646331"/>
+            </a:xfrm>
+            <a:prstGeom prst="rect">
+              <a:avLst/>
+            </a:prstGeom>
+            <a:ln>
+              <a:noFill/>
+            </a:ln>
+          </p:spPr>
+          <p:style>
+            <a:lnRef idx="1">
+              <a:schemeClr val="accent4"/>
+            </a:lnRef>
+            <a:fillRef idx="2">
+              <a:schemeClr val="accent4"/>
+            </a:fillRef>
+            <a:effectRef idx="1">
+              <a:schemeClr val="accent4"/>
+            </a:effectRef>
+            <a:fontRef idx="minor">
+              <a:schemeClr val="dk1"/>
+            </a:fontRef>
+          </p:style>
+          <p:txBody>
+            <a:bodyPr wrap="square" rtlCol="0">
+              <a:spAutoFit/>
+            </a:bodyPr>
+            <a:lstStyle/>
+            <a:p>
+              <a:r>
+                <a:rPr lang="el-GR" dirty="0" smtClean="0"/>
+                <a:t>Δ</a:t>
+              </a:r>
+              <a:r>
+                <a:rPr lang="en-GB" dirty="0" smtClean="0"/>
+                <a:t> Distribution of health risk factor</a:t>
+              </a:r>
+              <a:endParaRPr lang="en-GB" dirty="0"/>
+            </a:p>
+          </p:txBody>
+        </p:sp>
+        <p:sp>
+          <p:nvSpPr>
+            <p:cNvPr id="12" name="TextBox 11"/>
+            <p:cNvSpPr txBox="1"/>
+            <p:nvPr/>
+          </p:nvSpPr>
+          <p:spPr>
+            <a:xfrm>
+              <a:off x="2119313" y="1066802"/>
+              <a:ext cx="2070100" cy="1477328"/>
+            </a:xfrm>
+            <a:prstGeom prst="rect">
+              <a:avLst/>
+            </a:prstGeom>
+            <a:ln>
+              <a:noFill/>
+            </a:ln>
+          </p:spPr>
+          <p:style>
+            <a:lnRef idx="1">
+              <a:schemeClr val="accent4"/>
+            </a:lnRef>
+            <a:fillRef idx="2">
+              <a:schemeClr val="accent4"/>
+            </a:fillRef>
+            <a:effectRef idx="1">
+              <a:schemeClr val="accent4"/>
+            </a:effectRef>
+            <a:fontRef idx="minor">
+              <a:schemeClr val="dk1"/>
+            </a:fontRef>
+          </p:style>
+          <p:txBody>
+            <a:bodyPr wrap="square" rtlCol="0">
+              <a:spAutoFit/>
+            </a:bodyPr>
+            <a:lstStyle/>
+            <a:p>
+              <a:r>
+                <a:rPr lang="en-GB" dirty="0" smtClean="0"/>
+                <a:t>Dose-response health risk factor and disease/s (incidence/</a:t>
+              </a:r>
+            </a:p>
+            <a:p>
+              <a:r>
+                <a:rPr lang="en-GB" dirty="0" smtClean="0"/>
+                <a:t>mortality)</a:t>
+              </a:r>
+              <a:endParaRPr lang="en-GB" dirty="0"/>
+            </a:p>
+          </p:txBody>
+        </p:sp>
+        <p:sp>
+          <p:nvSpPr>
+            <p:cNvPr id="13" name="TextBox 12"/>
+            <p:cNvSpPr txBox="1"/>
+            <p:nvPr/>
+          </p:nvSpPr>
+          <p:spPr>
+            <a:xfrm>
+              <a:off x="5356220" y="2805500"/>
+              <a:ext cx="1285876" cy="923330"/>
+            </a:xfrm>
+            <a:prstGeom prst="rect">
+              <a:avLst/>
+            </a:prstGeom>
+            <a:ln>
+              <a:noFill/>
+            </a:ln>
+          </p:spPr>
+          <p:style>
+            <a:lnRef idx="1">
+              <a:schemeClr val="accent2"/>
+            </a:lnRef>
+            <a:fillRef idx="2">
+              <a:schemeClr val="accent2"/>
+            </a:fillRef>
+            <a:effectRef idx="1">
+              <a:schemeClr val="accent2"/>
+            </a:effectRef>
+            <a:fontRef idx="minor">
+              <a:schemeClr val="dk1"/>
+            </a:fontRef>
+          </p:style>
+          <p:txBody>
+            <a:bodyPr wrap="square" rtlCol="0">
+              <a:spAutoFit/>
+            </a:bodyPr>
+            <a:lstStyle/>
+            <a:p>
+              <a:r>
+                <a:rPr lang="en-GB" dirty="0" smtClean="0"/>
+                <a:t>Potential impact fraction</a:t>
+              </a:r>
+              <a:endParaRPr lang="en-GB" dirty="0"/>
+            </a:p>
+          </p:txBody>
+        </p:sp>
+        <p:cxnSp>
+          <p:nvCxnSpPr>
+            <p:cNvPr id="15" name="Straight Arrow Connector 14"/>
+            <p:cNvCxnSpPr>
+              <a:endCxn id="13" idx="1"/>
+            </p:cNvCxnSpPr>
+            <p:nvPr/>
+          </p:nvCxnSpPr>
+          <p:spPr>
+            <a:xfrm>
+              <a:off x="4205291" y="1981200"/>
+              <a:ext cx="1150929" cy="1285965"/>
+            </a:xfrm>
+            <a:prstGeom prst="straightConnector1">
+              <a:avLst/>
+            </a:prstGeom>
+            <a:ln w="28575">
+              <a:solidFill>
+                <a:schemeClr val="tx1"/>
+              </a:solidFill>
+              <a:tailEnd type="triangle"/>
+            </a:ln>
+          </p:spPr>
+          <p:style>
+            <a:lnRef idx="1">
+              <a:schemeClr val="accent1"/>
+            </a:lnRef>
+            <a:fillRef idx="0">
+              <a:schemeClr val="accent1"/>
+            </a:fillRef>
+            <a:effectRef idx="0">
+              <a:schemeClr val="accent1"/>
+            </a:effectRef>
+            <a:fontRef idx="minor">
+              <a:schemeClr val="tx1"/>
+            </a:fontRef>
+          </p:style>
+        </p:cxnSp>
+        <p:cxnSp>
+          <p:nvCxnSpPr>
+            <p:cNvPr id="18" name="Straight Arrow Connector 17"/>
+            <p:cNvCxnSpPr>
+              <a:stCxn id="9" idx="3"/>
+            </p:cNvCxnSpPr>
+            <p:nvPr/>
+          </p:nvCxnSpPr>
+          <p:spPr>
+            <a:xfrm>
+              <a:off x="4173536" y="3220690"/>
+              <a:ext cx="1166806" cy="0"/>
+            </a:xfrm>
+            <a:prstGeom prst="straightConnector1">
+              <a:avLst/>
+            </a:prstGeom>
+            <a:ln w="28575">
+              <a:solidFill>
+                <a:schemeClr val="tx1"/>
+              </a:solidFill>
+              <a:tailEnd type="triangle"/>
+            </a:ln>
+          </p:spPr>
+          <p:style>
+            <a:lnRef idx="1">
+              <a:schemeClr val="accent1"/>
+            </a:lnRef>
+            <a:fillRef idx="0">
+              <a:schemeClr val="accent1"/>
+            </a:fillRef>
+            <a:effectRef idx="0">
+              <a:schemeClr val="accent1"/>
+            </a:effectRef>
+            <a:fontRef idx="minor">
+              <a:schemeClr val="tx1"/>
+            </a:fontRef>
+          </p:style>
+        </p:cxnSp>
+        <p:sp>
+          <p:nvSpPr>
+            <p:cNvPr id="19" name="TextBox 18"/>
+            <p:cNvSpPr txBox="1"/>
+            <p:nvPr/>
+          </p:nvSpPr>
+          <p:spPr>
+            <a:xfrm>
+              <a:off x="7210424" y="3453369"/>
+              <a:ext cx="2809876" cy="2308324"/>
+            </a:xfrm>
+            <a:prstGeom prst="rect">
+              <a:avLst/>
+            </a:prstGeom>
+            <a:solidFill>
+              <a:schemeClr val="bg1">
+                <a:lumMod val="85000"/>
+              </a:schemeClr>
+            </a:solidFill>
+            <a:ln>
+              <a:noFill/>
+            </a:ln>
+          </p:spPr>
+          <p:style>
+            <a:lnRef idx="1">
+              <a:schemeClr val="dk1"/>
+            </a:lnRef>
+            <a:fillRef idx="2">
+              <a:schemeClr val="dk1"/>
+            </a:fillRef>
+            <a:effectRef idx="1">
+              <a:schemeClr val="dk1"/>
+            </a:effectRef>
+            <a:fontRef idx="minor">
+              <a:schemeClr val="dk1"/>
+            </a:fontRef>
+          </p:style>
+          <p:txBody>
+            <a:bodyPr wrap="square" rtlCol="0">
+              <a:spAutoFit/>
+            </a:bodyPr>
+            <a:lstStyle/>
+            <a:p>
+              <a:r>
+                <a:rPr lang="en-GB" b="1" dirty="0" smtClean="0"/>
+                <a:t>PMSLT: </a:t>
+              </a:r>
+            </a:p>
+            <a:p>
+              <a:r>
+                <a:rPr lang="en-GB" dirty="0" smtClean="0"/>
+                <a:t>-health-adjusted life years</a:t>
+              </a:r>
+            </a:p>
+            <a:p>
+              <a:r>
+                <a:rPr lang="en-GB" dirty="0" smtClean="0"/>
+                <a:t>-life years</a:t>
+              </a:r>
+            </a:p>
+            <a:p>
+              <a:r>
+                <a:rPr lang="en-GB" dirty="0" smtClean="0"/>
+                <a:t>-incidence/mortality</a:t>
+              </a:r>
+            </a:p>
+            <a:p>
+              <a:r>
+                <a:rPr lang="en-GB" dirty="0" smtClean="0"/>
+                <a:t>-life expectancy</a:t>
+              </a:r>
+            </a:p>
+            <a:p>
+              <a:r>
+                <a:rPr lang="en-GB" dirty="0" smtClean="0"/>
+                <a:t>-health-adjusted life </a:t>
+              </a:r>
+              <a:r>
+                <a:rPr lang="en-GB" dirty="0" smtClean="0"/>
+                <a:t>expectancy</a:t>
+              </a:r>
+            </a:p>
+            <a:p>
+              <a:r>
+                <a:rPr lang="en-GB" dirty="0" smtClean="0"/>
+                <a:t>-premature deaths</a:t>
+              </a:r>
+              <a:endParaRPr lang="en-GB" dirty="0" smtClean="0"/>
+            </a:p>
+          </p:txBody>
+        </p:sp>
+        <p:cxnSp>
+          <p:nvCxnSpPr>
+            <p:cNvPr id="20" name="Straight Arrow Connector 19"/>
+            <p:cNvCxnSpPr/>
+            <p:nvPr/>
+          </p:nvCxnSpPr>
+          <p:spPr>
+            <a:xfrm>
+              <a:off x="6642096" y="3267165"/>
+              <a:ext cx="568328" cy="1038135"/>
+            </a:xfrm>
+            <a:prstGeom prst="straightConnector1">
+              <a:avLst/>
+            </a:prstGeom>
+            <a:ln w="28575">
+              <a:solidFill>
+                <a:schemeClr val="tx1"/>
+              </a:solidFill>
+              <a:tailEnd type="triangle"/>
+            </a:ln>
+          </p:spPr>
+          <p:style>
+            <a:lnRef idx="1">
+              <a:schemeClr val="accent1"/>
+            </a:lnRef>
+            <a:fillRef idx="0">
+              <a:schemeClr val="accent1"/>
+            </a:fillRef>
+            <a:effectRef idx="0">
+              <a:schemeClr val="accent1"/>
+            </a:effectRef>
+            <a:fontRef idx="minor">
+              <a:schemeClr val="tx1"/>
+            </a:fontRef>
+          </p:style>
+        </p:cxnSp>
+      </p:grpSp>
       <p:cxnSp>
         <p:nvCxnSpPr>
-          <p:cNvPr id="6" name="Straight Arrow Connector 5"/>
-          <p:cNvCxnSpPr>
-            <a:stCxn id="4" idx="3"/>
-          </p:cNvCxnSpPr>
+          <p:cNvPr id="14" name="Straight Arrow Connector 13"/>
+          <p:cNvCxnSpPr/>
           <p:nvPr/>
         </p:nvCxnSpPr>
         <p:spPr>
           <a:xfrm flipV="1">
-            <a:off x="1828798" y="3245115"/>
-            <a:ext cx="290515" cy="22051"/>
+            <a:off x="6657974" y="2387600"/>
+            <a:ext cx="552450" cy="877719"/>
           </a:xfrm>
           <a:prstGeom prst="straightConnector1">
             <a:avLst/>
@@ -3055,237 +3457,13 @@
       </p:cxnSp>
       <p:sp>
         <p:nvSpPr>
-          <p:cNvPr id="9" name="TextBox 8"/>
+          <p:cNvPr id="16" name="TextBox 15"/>
           <p:cNvSpPr txBox="1"/>
           <p:nvPr/>
         </p:nvSpPr>
         <p:spPr>
           <a:xfrm>
-            <a:off x="2119313" y="2897524"/>
-            <a:ext cx="2054223" cy="646331"/>
-          </a:xfrm>
-          <a:prstGeom prst="rect">
-            <a:avLst/>
-          </a:prstGeom>
-          <a:ln>
-            <a:noFill/>
-          </a:ln>
-        </p:spPr>
-        <p:style>
-          <a:lnRef idx="1">
-            <a:schemeClr val="accent4"/>
-          </a:lnRef>
-          <a:fillRef idx="2">
-            <a:schemeClr val="accent4"/>
-          </a:fillRef>
-          <a:effectRef idx="1">
-            <a:schemeClr val="accent4"/>
-          </a:effectRef>
-          <a:fontRef idx="minor">
-            <a:schemeClr val="dk1"/>
-          </a:fontRef>
-        </p:style>
-        <p:txBody>
-          <a:bodyPr wrap="square" rtlCol="0">
-            <a:spAutoFit/>
-          </a:bodyPr>
-          <a:lstStyle/>
-          <a:p>
-            <a:r>
-              <a:rPr lang="el-GR" dirty="0" smtClean="0"/>
-              <a:t>Δ</a:t>
-            </a:r>
-            <a:r>
-              <a:rPr lang="en-GB" dirty="0" smtClean="0"/>
-              <a:t> Distribution of health risk factor</a:t>
-            </a:r>
-            <a:endParaRPr lang="en-GB" dirty="0"/>
-          </a:p>
-        </p:txBody>
-      </p:sp>
-      <p:sp>
-        <p:nvSpPr>
-          <p:cNvPr id="12" name="TextBox 11"/>
-          <p:cNvSpPr txBox="1"/>
-          <p:nvPr/>
-        </p:nvSpPr>
-        <p:spPr>
-          <a:xfrm>
-            <a:off x="2119313" y="1066802"/>
-            <a:ext cx="2070100" cy="1477328"/>
-          </a:xfrm>
-          <a:prstGeom prst="rect">
-            <a:avLst/>
-          </a:prstGeom>
-          <a:ln>
-            <a:noFill/>
-          </a:ln>
-        </p:spPr>
-        <p:style>
-          <a:lnRef idx="1">
-            <a:schemeClr val="accent4"/>
-          </a:lnRef>
-          <a:fillRef idx="2">
-            <a:schemeClr val="accent4"/>
-          </a:fillRef>
-          <a:effectRef idx="1">
-            <a:schemeClr val="accent4"/>
-          </a:effectRef>
-          <a:fontRef idx="minor">
-            <a:schemeClr val="dk1"/>
-          </a:fontRef>
-        </p:style>
-        <p:txBody>
-          <a:bodyPr wrap="square" rtlCol="0">
-            <a:spAutoFit/>
-          </a:bodyPr>
-          <a:lstStyle/>
-          <a:p>
-            <a:r>
-              <a:rPr lang="en-GB" dirty="0" smtClean="0"/>
-              <a:t>Dose-response health risk factor and disease/s (incidence/</a:t>
-            </a:r>
-          </a:p>
-          <a:p>
-            <a:r>
-              <a:rPr lang="en-GB" dirty="0" smtClean="0"/>
-              <a:t>mortality)</a:t>
-            </a:r>
-            <a:endParaRPr lang="en-GB" dirty="0"/>
-          </a:p>
-        </p:txBody>
-      </p:sp>
-      <p:sp>
-        <p:nvSpPr>
-          <p:cNvPr id="13" name="TextBox 12"/>
-          <p:cNvSpPr txBox="1"/>
-          <p:nvPr/>
-        </p:nvSpPr>
-        <p:spPr>
-          <a:xfrm>
-            <a:off x="5356220" y="2805500"/>
-            <a:ext cx="1285876" cy="923330"/>
-          </a:xfrm>
-          <a:prstGeom prst="rect">
-            <a:avLst/>
-          </a:prstGeom>
-          <a:ln>
-            <a:noFill/>
-          </a:ln>
-        </p:spPr>
-        <p:style>
-          <a:lnRef idx="1">
-            <a:schemeClr val="accent2"/>
-          </a:lnRef>
-          <a:fillRef idx="2">
-            <a:schemeClr val="accent2"/>
-          </a:fillRef>
-          <a:effectRef idx="1">
-            <a:schemeClr val="accent2"/>
-          </a:effectRef>
-          <a:fontRef idx="minor">
-            <a:schemeClr val="dk1"/>
-          </a:fontRef>
-        </p:style>
-        <p:txBody>
-          <a:bodyPr wrap="square" rtlCol="0">
-            <a:spAutoFit/>
-          </a:bodyPr>
-          <a:lstStyle/>
-          <a:p>
-            <a:r>
-              <a:rPr lang="en-GB" dirty="0" smtClean="0"/>
-              <a:t>Potential impact fraction</a:t>
-            </a:r>
-            <a:endParaRPr lang="en-GB" dirty="0"/>
-          </a:p>
-        </p:txBody>
-      </p:sp>
-      <p:cxnSp>
-        <p:nvCxnSpPr>
-          <p:cNvPr id="15" name="Straight Arrow Connector 14"/>
-          <p:cNvCxnSpPr>
-            <a:endCxn id="13" idx="1"/>
-          </p:cNvCxnSpPr>
-          <p:nvPr/>
-        </p:nvCxnSpPr>
-        <p:spPr>
-          <a:xfrm>
-            <a:off x="4205291" y="1981200"/>
-            <a:ext cx="1150929" cy="1285965"/>
-          </a:xfrm>
-          <a:prstGeom prst="straightConnector1">
-            <a:avLst/>
-          </a:prstGeom>
-          <a:ln w="28575">
-            <a:solidFill>
-              <a:schemeClr val="tx1"/>
-            </a:solidFill>
-            <a:tailEnd type="triangle"/>
-          </a:ln>
-        </p:spPr>
-        <p:style>
-          <a:lnRef idx="1">
-            <a:schemeClr val="accent1"/>
-          </a:lnRef>
-          <a:fillRef idx="0">
-            <a:schemeClr val="accent1"/>
-          </a:fillRef>
-          <a:effectRef idx="0">
-            <a:schemeClr val="accent1"/>
-          </a:effectRef>
-          <a:fontRef idx="minor">
-            <a:schemeClr val="tx1"/>
-          </a:fontRef>
-        </p:style>
-      </p:cxnSp>
-      <p:cxnSp>
-        <p:nvCxnSpPr>
-          <p:cNvPr id="18" name="Straight Arrow Connector 17"/>
-          <p:cNvCxnSpPr>
-            <a:stCxn id="9" idx="3"/>
-          </p:cNvCxnSpPr>
-          <p:nvPr/>
-        </p:nvCxnSpPr>
-        <p:spPr>
-          <a:xfrm>
-            <a:off x="4173536" y="3220690"/>
-            <a:ext cx="1166806" cy="0"/>
-          </a:xfrm>
-          <a:prstGeom prst="straightConnector1">
-            <a:avLst/>
-          </a:prstGeom>
-          <a:ln w="28575">
-            <a:solidFill>
-              <a:schemeClr val="tx1"/>
-            </a:solidFill>
-            <a:tailEnd type="triangle"/>
-          </a:ln>
-        </p:spPr>
-        <p:style>
-          <a:lnRef idx="1">
-            <a:schemeClr val="accent1"/>
-          </a:lnRef>
-          <a:fillRef idx="0">
-            <a:schemeClr val="accent1"/>
-          </a:fillRef>
-          <a:effectRef idx="0">
-            <a:schemeClr val="accent1"/>
-          </a:effectRef>
-          <a:fontRef idx="minor">
-            <a:schemeClr val="tx1"/>
-          </a:fontRef>
-        </p:style>
-      </p:cxnSp>
-      <p:sp>
-        <p:nvSpPr>
-          <p:cNvPr id="19" name="TextBox 18"/>
-          <p:cNvSpPr txBox="1"/>
-          <p:nvPr/>
-        </p:nvSpPr>
-        <p:spPr>
-          <a:xfrm>
-            <a:off x="7070724" y="2297669"/>
+            <a:off x="7210424" y="885040"/>
             <a:ext cx="2809876" cy="2031325"/>
           </a:xfrm>
           <a:prstGeom prst="rect">
@@ -3321,78 +3499,47 @@
           <a:lstStyle/>
           <a:p>
             <a:r>
+              <a:rPr lang="en-GB" b="1" dirty="0" smtClean="0"/>
+              <a:t>ITHIM:</a:t>
+            </a:r>
+          </a:p>
+          <a:p>
+            <a:r>
               <a:rPr lang="en-GB" dirty="0" smtClean="0"/>
-              <a:t>PMSLT: </a:t>
+              <a:t>-disability-adjusted life years</a:t>
             </a:r>
           </a:p>
           <a:p>
             <a:r>
               <a:rPr lang="en-GB" dirty="0" smtClean="0"/>
-              <a:t>-health-adjusted life years</a:t>
+              <a:t>-years of life lost</a:t>
             </a:r>
           </a:p>
           <a:p>
             <a:r>
               <a:rPr lang="en-GB" dirty="0" smtClean="0"/>
-              <a:t>-life years</a:t>
+              <a:t>-years lived with disability</a:t>
             </a:r>
           </a:p>
           <a:p>
             <a:r>
               <a:rPr lang="en-GB" dirty="0" smtClean="0"/>
-              <a:t>-incidence/mortality</a:t>
-            </a:r>
-          </a:p>
-          <a:p>
+              <a:t>-</a:t>
+            </a:r>
+            <a:r>
+              <a:rPr lang="en-GB" dirty="0"/>
+              <a:t>p</a:t>
+            </a:r>
             <a:r>
               <a:rPr lang="en-GB" dirty="0" smtClean="0"/>
-              <a:t>-life expectancy</a:t>
-            </a:r>
-          </a:p>
-          <a:p>
-            <a:r>
-              <a:rPr lang="en-GB" dirty="0" smtClean="0"/>
-              <a:t>-health-adjusted life expectancy</a:t>
-            </a:r>
-          </a:p>
-        </p:txBody>
-      </p:sp>
-      <p:cxnSp>
-        <p:nvCxnSpPr>
-          <p:cNvPr id="20" name="Straight Arrow Connector 19"/>
-          <p:cNvCxnSpPr/>
-          <p:nvPr/>
-        </p:nvCxnSpPr>
-        <p:spPr>
-          <a:xfrm flipV="1">
-            <a:off x="6642096" y="3262699"/>
-            <a:ext cx="377827" cy="4466"/>
-          </a:xfrm>
-          <a:prstGeom prst="straightConnector1">
-            <a:avLst/>
-          </a:prstGeom>
-          <a:ln w="28575">
-            <a:solidFill>
-              <a:schemeClr val="tx1"/>
-            </a:solidFill>
-            <a:tailEnd type="triangle"/>
-          </a:ln>
-        </p:spPr>
-        <p:style>
-          <a:lnRef idx="1">
-            <a:schemeClr val="accent1"/>
-          </a:lnRef>
-          <a:fillRef idx="0">
-            <a:schemeClr val="accent1"/>
-          </a:fillRef>
-          <a:effectRef idx="0">
-            <a:schemeClr val="accent1"/>
-          </a:effectRef>
-          <a:fontRef idx="minor">
-            <a:schemeClr val="tx1"/>
-          </a:fontRef>
-        </p:style>
-      </p:cxnSp>
+              <a:t>remature deaths </a:t>
+            </a:r>
+          </a:p>
+          <a:p>
+            <a:endParaRPr lang="en-GB" dirty="0" smtClean="0"/>
+          </a:p>
+        </p:txBody>
+      </p:sp>
     </p:spTree>
     <p:extLst>
       <p:ext uri="{BB962C8B-B14F-4D97-AF65-F5344CB8AC3E}">

</xml_diff>